<commit_message>
Checked in new version for quoting for client (works for XML but not for JSON).  Checked in tutorial.
</commit_message>
<xml_diff>
--- a/X3DJSONLoaderTutorial.pptx
+++ b/X3DJSONLoaderTutorial.pptx
@@ -250,7 +250,7 @@
           <a:p>
             <a:fld id="{A269C036-8BCC-4E89-9455-BC85A1FB6334}" type="datetimeFigureOut">
               <a:rPr lang="en-US" smtClean="0"/>
-              <a:t>3/5/2017</a:t>
+              <a:t>4/26/2017</a:t>
             </a:fld>
             <a:endParaRPr lang="en-US"/>
           </a:p>
@@ -418,7 +418,7 @@
           <a:p>
             <a:fld id="{A269C036-8BCC-4E89-9455-BC85A1FB6334}" type="datetimeFigureOut">
               <a:rPr lang="en-US" smtClean="0"/>
-              <a:t>3/5/2017</a:t>
+              <a:t>4/26/2017</a:t>
             </a:fld>
             <a:endParaRPr lang="en-US"/>
           </a:p>
@@ -596,7 +596,7 @@
           <a:p>
             <a:fld id="{A269C036-8BCC-4E89-9455-BC85A1FB6334}" type="datetimeFigureOut">
               <a:rPr lang="en-US" smtClean="0"/>
-              <a:t>3/5/2017</a:t>
+              <a:t>4/26/2017</a:t>
             </a:fld>
             <a:endParaRPr lang="en-US"/>
           </a:p>
@@ -764,7 +764,7 @@
           <a:p>
             <a:fld id="{A269C036-8BCC-4E89-9455-BC85A1FB6334}" type="datetimeFigureOut">
               <a:rPr lang="en-US" smtClean="0"/>
-              <a:t>3/5/2017</a:t>
+              <a:t>4/26/2017</a:t>
             </a:fld>
             <a:endParaRPr lang="en-US"/>
           </a:p>
@@ -1009,7 +1009,7 @@
           <a:p>
             <a:fld id="{A269C036-8BCC-4E89-9455-BC85A1FB6334}" type="datetimeFigureOut">
               <a:rPr lang="en-US" smtClean="0"/>
-              <a:t>3/5/2017</a:t>
+              <a:t>4/26/2017</a:t>
             </a:fld>
             <a:endParaRPr lang="en-US"/>
           </a:p>
@@ -1238,7 +1238,7 @@
           <a:p>
             <a:fld id="{A269C036-8BCC-4E89-9455-BC85A1FB6334}" type="datetimeFigureOut">
               <a:rPr lang="en-US" smtClean="0"/>
-              <a:t>3/5/2017</a:t>
+              <a:t>4/26/2017</a:t>
             </a:fld>
             <a:endParaRPr lang="en-US"/>
           </a:p>
@@ -1602,7 +1602,7 @@
           <a:p>
             <a:fld id="{A269C036-8BCC-4E89-9455-BC85A1FB6334}" type="datetimeFigureOut">
               <a:rPr lang="en-US" smtClean="0"/>
-              <a:t>3/5/2017</a:t>
+              <a:t>4/26/2017</a:t>
             </a:fld>
             <a:endParaRPr lang="en-US"/>
           </a:p>
@@ -1719,7 +1719,7 @@
           <a:p>
             <a:fld id="{A269C036-8BCC-4E89-9455-BC85A1FB6334}" type="datetimeFigureOut">
               <a:rPr lang="en-US" smtClean="0"/>
-              <a:t>3/5/2017</a:t>
+              <a:t>4/26/2017</a:t>
             </a:fld>
             <a:endParaRPr lang="en-US"/>
           </a:p>
@@ -1814,7 +1814,7 @@
           <a:p>
             <a:fld id="{A269C036-8BCC-4E89-9455-BC85A1FB6334}" type="datetimeFigureOut">
               <a:rPr lang="en-US" smtClean="0"/>
-              <a:t>3/5/2017</a:t>
+              <a:t>4/26/2017</a:t>
             </a:fld>
             <a:endParaRPr lang="en-US"/>
           </a:p>
@@ -2089,7 +2089,7 @@
           <a:p>
             <a:fld id="{A269C036-8BCC-4E89-9455-BC85A1FB6334}" type="datetimeFigureOut">
               <a:rPr lang="en-US" smtClean="0"/>
-              <a:t>3/5/2017</a:t>
+              <a:t>4/26/2017</a:t>
             </a:fld>
             <a:endParaRPr lang="en-US"/>
           </a:p>
@@ -2341,7 +2341,7 @@
           <a:p>
             <a:fld id="{A269C036-8BCC-4E89-9455-BC85A1FB6334}" type="datetimeFigureOut">
               <a:rPr lang="en-US" smtClean="0"/>
-              <a:t>3/5/2017</a:t>
+              <a:t>4/26/2017</a:t>
             </a:fld>
             <a:endParaRPr lang="en-US"/>
           </a:p>
@@ -2552,7 +2552,7 @@
           <a:p>
             <a:fld id="{A269C036-8BCC-4E89-9455-BC85A1FB6334}" type="datetimeFigureOut">
               <a:rPr lang="en-US" smtClean="0"/>
-              <a:t>3/5/2017</a:t>
+              <a:t>4/26/2017</a:t>
             </a:fld>
             <a:endParaRPr lang="en-US"/>
           </a:p>
@@ -3371,7 +3371,9 @@
         </p:nvSpPr>
         <p:spPr/>
         <p:txBody>
-          <a:bodyPr/>
+          <a:bodyPr>
+            <a:normAutofit lnSpcReduction="10000"/>
+          </a:bodyPr>
           <a:lstStyle/>
           <a:p>
             <a:r>
@@ -3400,24 +3402,33 @@
               <a:rPr lang="en-US" dirty="0" err="1"/>
               <a:t>serializer</a:t>
             </a:r>
-            <a:endParaRPr lang="en-US" dirty="0"/>
-          </a:p>
-          <a:p>
-            <a:r>
-              <a:rPr lang="en-US" dirty="0"/>
-              <a:t>PythonSerializer.js – serialize DOM to Python</a:t>
-            </a:r>
-          </a:p>
-          <a:p>
-            <a:r>
-              <a:rPr lang="en-US" dirty="0"/>
-              <a:t>JavaSerializer.js – serialize DOM to Java (imperative, variables).</a:t>
-            </a:r>
-          </a:p>
-          <a:p>
-            <a:r>
-              <a:rPr lang="en-US" dirty="0"/>
-              <a:t>JavaSerializerNew.js – serialize DOM to Java (declarative, chained).</a:t>
+            <a:r>
+              <a:rPr lang="en-US" dirty="0"/>
+              <a:t>.</a:t>
+            </a:r>
+          </a:p>
+          <a:p>
+            <a:r>
+              <a:rPr lang="en-US" dirty="0"/>
+              <a:t>json2all.js – driver script for convertJSON.js</a:t>
+            </a:r>
+          </a:p>
+          <a:p>
+            <a:r>
+              <a:rPr lang="en-US" dirty="0"/>
+              <a:t>PythonSerializer.js – serialize DOM to Python (old, unfinished).</a:t>
+            </a:r>
+          </a:p>
+          <a:p>
+            <a:r>
+              <a:rPr lang="en-US" dirty="0"/>
+              <a:t>JavaSerializer.js – serialize DOM to Java.</a:t>
+            </a:r>
+          </a:p>
+          <a:p>
+            <a:r>
+              <a:rPr lang="en-US" dirty="0"/>
+              <a:t>JavaScriptSerializerNew.js – serialize DOM to JavaScript.</a:t>
             </a:r>
           </a:p>
           <a:p>
@@ -3775,6 +3786,17 @@
               <a:t>, xml log, and namespace returns DOM element</a:t>
             </a:r>
           </a:p>
+          <a:p>
+            <a:r>
+              <a:rPr lang="en-US" dirty="0"/>
+              <a:t>Client side does Inline processing of JSON since X3DOM and Cobweb </a:t>
+            </a:r>
+            <a:r>
+              <a:rPr lang="en-US"/>
+              <a:t>don’t support JSON yet.</a:t>
+            </a:r>
+            <a:endParaRPr lang="en-US" dirty="0"/>
+          </a:p>
         </p:txBody>
       </p:sp>
     </p:spTree>
@@ -4195,7 +4217,15 @@
             <a:pPr lvl="1"/>
             <a:r>
               <a:rPr lang="en-US" dirty="0"/>
-              <a:t>Convert JSON to XML, Python, Java (2 forms)</a:t>
+              <a:t>Convert JSON to XML, Python, Java and </a:t>
+            </a:r>
+            <a:r>
+              <a:rPr lang="en-US" dirty="0" err="1"/>
+              <a:t>Nashorn</a:t>
+            </a:r>
+            <a:r>
+              <a:rPr lang="en-US" dirty="0"/>
+              <a:t> JavaScript</a:t>
             </a:r>
           </a:p>
           <a:p>

</xml_diff>